<commit_message>
New Code Folder + Projecthon Updated in PPT
</commit_message>
<xml_diff>
--- a/Projecthon-Team1-Oct23/Documents/Open Land Agriculture Monitoring System.pptx
+++ b/Projecthon-Team1-Oct23/Documents/Open Land Agriculture Monitoring System.pptx
@@ -14,9 +14,9 @@
     <p:sldId id="259" r:id="rId5"/>
     <p:sldId id="260" r:id="rId6"/>
     <p:sldId id="261" r:id="rId7"/>
-    <p:sldId id="262" r:id="rId8"/>
+    <p:sldId id="264" r:id="rId8"/>
     <p:sldId id="263" r:id="rId9"/>
-    <p:sldId id="264" r:id="rId10"/>
+    <p:sldId id="262" r:id="rId10"/>
     <p:sldId id="265" r:id="rId11"/>
     <p:sldId id="266" r:id="rId12"/>
     <p:sldId id="267" r:id="rId13"/>
@@ -1695,7 +1695,7 @@
         </p:nvSpPr>
         <p:spPr>
           <a:xfrm>
-            <a:off x="381300" y="685800"/>
+            <a:off x="381000" y="685800"/>
             <a:ext cx="6096000" cy="3429000"/>
           </a:xfrm>
           <a:custGeom>
@@ -1879,6 +1879,214 @@
   <p:cSld>
     <p:spTree>
       <p:nvGrpSpPr>
+        <p:cNvPr id="1" name="Shape 112"/>
+        <p:cNvGrpSpPr/>
+        <p:nvPr/>
+      </p:nvGrpSpPr>
+      <p:grpSpPr>
+        <a:xfrm>
+          <a:off x="0" y="0"/>
+          <a:ext cx="0" cy="0"/>
+          <a:chOff x="0" y="0"/>
+          <a:chExt cx="0" cy="0"/>
+        </a:xfrm>
+      </p:grpSpPr>
+      <p:sp>
+        <p:nvSpPr>
+          <p:cNvPr id="113" name="Google Shape;113;g2476aec5496_1_22:notes"/>
+          <p:cNvSpPr>
+            <a:spLocks noGrp="1" noRot="1" noChangeAspect="1"/>
+          </p:cNvSpPr>
+          <p:nvPr>
+            <p:ph type="sldImg" idx="2"/>
+          </p:nvPr>
+        </p:nvSpPr>
+        <p:spPr>
+          <a:xfrm>
+            <a:off x="381000" y="685800"/>
+            <a:ext cx="6096000" cy="3429000"/>
+          </a:xfrm>
+          <a:custGeom>
+            <a:avLst/>
+            <a:gdLst/>
+            <a:ahLst/>
+            <a:cxnLst/>
+            <a:rect l="l" t="t" r="r" b="b"/>
+            <a:pathLst>
+              <a:path w="120000" h="120000" extrusionOk="0">
+                <a:moveTo>
+                  <a:pt x="0" y="0"/>
+                </a:moveTo>
+                <a:lnTo>
+                  <a:pt x="120000" y="0"/>
+                </a:lnTo>
+                <a:lnTo>
+                  <a:pt x="120000" y="120000"/>
+                </a:lnTo>
+                <a:lnTo>
+                  <a:pt x="0" y="120000"/>
+                </a:lnTo>
+                <a:close/>
+              </a:path>
+            </a:pathLst>
+          </a:custGeom>
+        </p:spPr>
+      </p:sp>
+      <p:sp>
+        <p:nvSpPr>
+          <p:cNvPr id="114" name="Google Shape;114;g2476aec5496_1_22:notes"/>
+          <p:cNvSpPr txBox="1">
+            <a:spLocks noGrp="1"/>
+          </p:cNvSpPr>
+          <p:nvPr>
+            <p:ph type="body" idx="1"/>
+          </p:nvPr>
+        </p:nvSpPr>
+        <p:spPr>
+          <a:xfrm>
+            <a:off x="685800" y="4343400"/>
+            <a:ext cx="5486400" cy="4114800"/>
+          </a:xfrm>
+          <a:prstGeom prst="rect">
+            <a:avLst/>
+          </a:prstGeom>
+        </p:spPr>
+        <p:txBody>
+          <a:bodyPr spcFirstLastPara="1" wrap="square" lIns="91425" tIns="91425" rIns="91425" bIns="91425" anchor="t" anchorCtr="0">
+            <a:noAutofit/>
+          </a:bodyPr>
+          <a:lstStyle/>
+          <a:p>
+            <a:pPr marL="0" lvl="0" indent="0" algn="l" rtl="0">
+              <a:spcBef>
+                <a:spcPts val="0"/>
+              </a:spcBef>
+              <a:spcAft>
+                <a:spcPts val="0"/>
+              </a:spcAft>
+              <a:buNone/>
+            </a:pPr>
+            <a:endParaRPr/>
+          </a:p>
+        </p:txBody>
+      </p:sp>
+    </p:spTree>
+  </p:cSld>
+  <p:clrMapOvr>
+    <a:masterClrMapping/>
+  </p:clrMapOvr>
+</p:notes>
+</file>
+
+<file path=ppt/notesSlides/notesSlide8.xml><?xml version="1.0" encoding="utf-8"?>
+<p:notes xmlns:a="http://schemas.openxmlformats.org/drawingml/2006/main" xmlns:r="http://schemas.openxmlformats.org/officeDocument/2006/relationships" xmlns:p="http://schemas.openxmlformats.org/presentationml/2006/main" showMasterSp="0" showMasterPhAnim="0">
+  <p:cSld>
+    <p:spTree>
+      <p:nvGrpSpPr>
+        <p:cNvPr id="1" name="Shape 106"/>
+        <p:cNvGrpSpPr/>
+        <p:nvPr/>
+      </p:nvGrpSpPr>
+      <p:grpSpPr>
+        <a:xfrm>
+          <a:off x="0" y="0"/>
+          <a:ext cx="0" cy="0"/>
+          <a:chOff x="0" y="0"/>
+          <a:chExt cx="0" cy="0"/>
+        </a:xfrm>
+      </p:grpSpPr>
+      <p:sp>
+        <p:nvSpPr>
+          <p:cNvPr id="107" name="Google Shape;107;g2476aec5496_1_14:notes"/>
+          <p:cNvSpPr>
+            <a:spLocks noGrp="1" noRot="1" noChangeAspect="1"/>
+          </p:cNvSpPr>
+          <p:nvPr>
+            <p:ph type="sldImg" idx="2"/>
+          </p:nvPr>
+        </p:nvSpPr>
+        <p:spPr>
+          <a:xfrm>
+            <a:off x="381000" y="685800"/>
+            <a:ext cx="6096000" cy="3429000"/>
+          </a:xfrm>
+          <a:custGeom>
+            <a:avLst/>
+            <a:gdLst/>
+            <a:ahLst/>
+            <a:cxnLst/>
+            <a:rect l="l" t="t" r="r" b="b"/>
+            <a:pathLst>
+              <a:path w="120000" h="120000" extrusionOk="0">
+                <a:moveTo>
+                  <a:pt x="0" y="0"/>
+                </a:moveTo>
+                <a:lnTo>
+                  <a:pt x="120000" y="0"/>
+                </a:lnTo>
+                <a:lnTo>
+                  <a:pt x="120000" y="120000"/>
+                </a:lnTo>
+                <a:lnTo>
+                  <a:pt x="0" y="120000"/>
+                </a:lnTo>
+                <a:close/>
+              </a:path>
+            </a:pathLst>
+          </a:custGeom>
+        </p:spPr>
+      </p:sp>
+      <p:sp>
+        <p:nvSpPr>
+          <p:cNvPr id="108" name="Google Shape;108;g2476aec5496_1_14:notes"/>
+          <p:cNvSpPr txBox="1">
+            <a:spLocks noGrp="1"/>
+          </p:cNvSpPr>
+          <p:nvPr>
+            <p:ph type="body" idx="1"/>
+          </p:nvPr>
+        </p:nvSpPr>
+        <p:spPr>
+          <a:xfrm>
+            <a:off x="685800" y="4343400"/>
+            <a:ext cx="5486400" cy="4114800"/>
+          </a:xfrm>
+          <a:prstGeom prst="rect">
+            <a:avLst/>
+          </a:prstGeom>
+        </p:spPr>
+        <p:txBody>
+          <a:bodyPr spcFirstLastPara="1" wrap="square" lIns="91425" tIns="91425" rIns="91425" bIns="91425" anchor="t" anchorCtr="0">
+            <a:noAutofit/>
+          </a:bodyPr>
+          <a:lstStyle/>
+          <a:p>
+            <a:pPr marL="0" lvl="0" indent="0" algn="l" rtl="0">
+              <a:spcBef>
+                <a:spcPts val="0"/>
+              </a:spcBef>
+              <a:spcAft>
+                <a:spcPts val="0"/>
+              </a:spcAft>
+              <a:buNone/>
+            </a:pPr>
+            <a:endParaRPr/>
+          </a:p>
+        </p:txBody>
+      </p:sp>
+    </p:spTree>
+  </p:cSld>
+  <p:clrMapOvr>
+    <a:masterClrMapping/>
+  </p:clrMapOvr>
+</p:notes>
+</file>
+
+<file path=ppt/notesSlides/notesSlide9.xml><?xml version="1.0" encoding="utf-8"?>
+<p:notes xmlns:a="http://schemas.openxmlformats.org/drawingml/2006/main" xmlns:r="http://schemas.openxmlformats.org/officeDocument/2006/relationships" xmlns:p="http://schemas.openxmlformats.org/presentationml/2006/main" showMasterSp="0" showMasterPhAnim="0">
+  <p:cSld>
+    <p:spTree>
+      <p:nvGrpSpPr>
         <p:cNvPr id="1" name="Shape 100"/>
         <p:cNvGrpSpPr/>
         <p:nvPr/>
@@ -1935,214 +2143,6 @@
       <p:sp>
         <p:nvSpPr>
           <p:cNvPr id="102" name="Google Shape;102;g2476aec5496_1_7:notes"/>
-          <p:cNvSpPr txBox="1">
-            <a:spLocks noGrp="1"/>
-          </p:cNvSpPr>
-          <p:nvPr>
-            <p:ph type="body" idx="1"/>
-          </p:nvPr>
-        </p:nvSpPr>
-        <p:spPr>
-          <a:xfrm>
-            <a:off x="685800" y="4343400"/>
-            <a:ext cx="5486400" cy="4114800"/>
-          </a:xfrm>
-          <a:prstGeom prst="rect">
-            <a:avLst/>
-          </a:prstGeom>
-        </p:spPr>
-        <p:txBody>
-          <a:bodyPr spcFirstLastPara="1" wrap="square" lIns="91425" tIns="91425" rIns="91425" bIns="91425" anchor="t" anchorCtr="0">
-            <a:noAutofit/>
-          </a:bodyPr>
-          <a:lstStyle/>
-          <a:p>
-            <a:pPr marL="0" lvl="0" indent="0" algn="l" rtl="0">
-              <a:spcBef>
-                <a:spcPts val="0"/>
-              </a:spcBef>
-              <a:spcAft>
-                <a:spcPts val="0"/>
-              </a:spcAft>
-              <a:buNone/>
-            </a:pPr>
-            <a:endParaRPr/>
-          </a:p>
-        </p:txBody>
-      </p:sp>
-    </p:spTree>
-  </p:cSld>
-  <p:clrMapOvr>
-    <a:masterClrMapping/>
-  </p:clrMapOvr>
-</p:notes>
-</file>
-
-<file path=ppt/notesSlides/notesSlide8.xml><?xml version="1.0" encoding="utf-8"?>
-<p:notes xmlns:a="http://schemas.openxmlformats.org/drawingml/2006/main" xmlns:r="http://schemas.openxmlformats.org/officeDocument/2006/relationships" xmlns:p="http://schemas.openxmlformats.org/presentationml/2006/main" showMasterSp="0" showMasterPhAnim="0">
-  <p:cSld>
-    <p:spTree>
-      <p:nvGrpSpPr>
-        <p:cNvPr id="1" name="Shape 106"/>
-        <p:cNvGrpSpPr/>
-        <p:nvPr/>
-      </p:nvGrpSpPr>
-      <p:grpSpPr>
-        <a:xfrm>
-          <a:off x="0" y="0"/>
-          <a:ext cx="0" cy="0"/>
-          <a:chOff x="0" y="0"/>
-          <a:chExt cx="0" cy="0"/>
-        </a:xfrm>
-      </p:grpSpPr>
-      <p:sp>
-        <p:nvSpPr>
-          <p:cNvPr id="107" name="Google Shape;107;g2476aec5496_1_14:notes"/>
-          <p:cNvSpPr>
-            <a:spLocks noGrp="1" noRot="1" noChangeAspect="1"/>
-          </p:cNvSpPr>
-          <p:nvPr>
-            <p:ph type="sldImg" idx="2"/>
-          </p:nvPr>
-        </p:nvSpPr>
-        <p:spPr>
-          <a:xfrm>
-            <a:off x="381300" y="685800"/>
-            <a:ext cx="6096000" cy="3429000"/>
-          </a:xfrm>
-          <a:custGeom>
-            <a:avLst/>
-            <a:gdLst/>
-            <a:ahLst/>
-            <a:cxnLst/>
-            <a:rect l="l" t="t" r="r" b="b"/>
-            <a:pathLst>
-              <a:path w="120000" h="120000" extrusionOk="0">
-                <a:moveTo>
-                  <a:pt x="0" y="0"/>
-                </a:moveTo>
-                <a:lnTo>
-                  <a:pt x="120000" y="0"/>
-                </a:lnTo>
-                <a:lnTo>
-                  <a:pt x="120000" y="120000"/>
-                </a:lnTo>
-                <a:lnTo>
-                  <a:pt x="0" y="120000"/>
-                </a:lnTo>
-                <a:close/>
-              </a:path>
-            </a:pathLst>
-          </a:custGeom>
-        </p:spPr>
-      </p:sp>
-      <p:sp>
-        <p:nvSpPr>
-          <p:cNvPr id="108" name="Google Shape;108;g2476aec5496_1_14:notes"/>
-          <p:cNvSpPr txBox="1">
-            <a:spLocks noGrp="1"/>
-          </p:cNvSpPr>
-          <p:nvPr>
-            <p:ph type="body" idx="1"/>
-          </p:nvPr>
-        </p:nvSpPr>
-        <p:spPr>
-          <a:xfrm>
-            <a:off x="685800" y="4343400"/>
-            <a:ext cx="5486400" cy="4114800"/>
-          </a:xfrm>
-          <a:prstGeom prst="rect">
-            <a:avLst/>
-          </a:prstGeom>
-        </p:spPr>
-        <p:txBody>
-          <a:bodyPr spcFirstLastPara="1" wrap="square" lIns="91425" tIns="91425" rIns="91425" bIns="91425" anchor="t" anchorCtr="0">
-            <a:noAutofit/>
-          </a:bodyPr>
-          <a:lstStyle/>
-          <a:p>
-            <a:pPr marL="0" lvl="0" indent="0" algn="l" rtl="0">
-              <a:spcBef>
-                <a:spcPts val="0"/>
-              </a:spcBef>
-              <a:spcAft>
-                <a:spcPts val="0"/>
-              </a:spcAft>
-              <a:buNone/>
-            </a:pPr>
-            <a:endParaRPr/>
-          </a:p>
-        </p:txBody>
-      </p:sp>
-    </p:spTree>
-  </p:cSld>
-  <p:clrMapOvr>
-    <a:masterClrMapping/>
-  </p:clrMapOvr>
-</p:notes>
-</file>
-
-<file path=ppt/notesSlides/notesSlide9.xml><?xml version="1.0" encoding="utf-8"?>
-<p:notes xmlns:a="http://schemas.openxmlformats.org/drawingml/2006/main" xmlns:r="http://schemas.openxmlformats.org/officeDocument/2006/relationships" xmlns:p="http://schemas.openxmlformats.org/presentationml/2006/main" showMasterSp="0" showMasterPhAnim="0">
-  <p:cSld>
-    <p:spTree>
-      <p:nvGrpSpPr>
-        <p:cNvPr id="1" name="Shape 112"/>
-        <p:cNvGrpSpPr/>
-        <p:nvPr/>
-      </p:nvGrpSpPr>
-      <p:grpSpPr>
-        <a:xfrm>
-          <a:off x="0" y="0"/>
-          <a:ext cx="0" cy="0"/>
-          <a:chOff x="0" y="0"/>
-          <a:chExt cx="0" cy="0"/>
-        </a:xfrm>
-      </p:grpSpPr>
-      <p:sp>
-        <p:nvSpPr>
-          <p:cNvPr id="113" name="Google Shape;113;g2476aec5496_1_22:notes"/>
-          <p:cNvSpPr>
-            <a:spLocks noGrp="1" noRot="1" noChangeAspect="1"/>
-          </p:cNvSpPr>
-          <p:nvPr>
-            <p:ph type="sldImg" idx="2"/>
-          </p:nvPr>
-        </p:nvSpPr>
-        <p:spPr>
-          <a:xfrm>
-            <a:off x="381300" y="685800"/>
-            <a:ext cx="6096000" cy="3429000"/>
-          </a:xfrm>
-          <a:custGeom>
-            <a:avLst/>
-            <a:gdLst/>
-            <a:ahLst/>
-            <a:cxnLst/>
-            <a:rect l="l" t="t" r="r" b="b"/>
-            <a:pathLst>
-              <a:path w="120000" h="120000" extrusionOk="0">
-                <a:moveTo>
-                  <a:pt x="0" y="0"/>
-                </a:moveTo>
-                <a:lnTo>
-                  <a:pt x="120000" y="0"/>
-                </a:lnTo>
-                <a:lnTo>
-                  <a:pt x="120000" y="120000"/>
-                </a:lnTo>
-                <a:lnTo>
-                  <a:pt x="0" y="120000"/>
-                </a:lnTo>
-                <a:close/>
-              </a:path>
-            </a:pathLst>
-          </a:custGeom>
-        </p:spPr>
-      </p:sp>
-      <p:sp>
-        <p:nvSpPr>
-          <p:cNvPr id="114" name="Google Shape;114;g2476aec5496_1_22:notes"/>
           <p:cNvSpPr txBox="1">
             <a:spLocks noGrp="1"/>
           </p:cNvSpPr>
@@ -9750,10 +9750,10 @@
               <a:buNone/>
             </a:pPr>
             <a:r>
-              <a:rPr lang="en"/>
+              <a:rPr lang="en" dirty="0"/>
               <a:t>Soil moisture sensor</a:t>
             </a:r>
-            <a:endParaRPr/>
+            <a:endParaRPr dirty="0"/>
           </a:p>
         </p:txBody>
       </p:sp>
@@ -9950,10 +9950,10 @@
               <a:buNone/>
             </a:pPr>
             <a:r>
-              <a:rPr lang="en"/>
+              <a:rPr lang="en" dirty="0"/>
               <a:t>Temperature sensor</a:t>
             </a:r>
-            <a:endParaRPr/>
+            <a:endParaRPr dirty="0"/>
           </a:p>
         </p:txBody>
       </p:sp>
@@ -10164,55 +10164,6 @@
           <a:xfrm rot="-5400000">
             <a:off x="1560800" y="2536475"/>
             <a:ext cx="211200" cy="307200"/>
-          </a:xfrm>
-          <a:prstGeom prst="upArrow">
-            <a:avLst>
-              <a:gd name="adj1" fmla="val 50000"/>
-              <a:gd name="adj2" fmla="val 50000"/>
-            </a:avLst>
-          </a:prstGeom>
-          <a:solidFill>
-            <a:schemeClr val="lt2"/>
-          </a:solidFill>
-          <a:ln w="9525" cap="flat" cmpd="sng">
-            <a:solidFill>
-              <a:schemeClr val="dk2"/>
-            </a:solidFill>
-            <a:prstDash val="solid"/>
-            <a:round/>
-            <a:headEnd type="none" w="sm" len="sm"/>
-            <a:tailEnd type="none" w="sm" len="sm"/>
-          </a:ln>
-        </p:spPr>
-        <p:txBody>
-          <a:bodyPr spcFirstLastPara="1" wrap="square" lIns="91425" tIns="91425" rIns="91425" bIns="91425" anchor="ctr" anchorCtr="0">
-            <a:noAutofit/>
-          </a:bodyPr>
-          <a:lstStyle/>
-          <a:p>
-            <a:pPr marL="0" lvl="0" indent="0" algn="ctr" rtl="0">
-              <a:spcBef>
-                <a:spcPts val="0"/>
-              </a:spcBef>
-              <a:spcAft>
-                <a:spcPts val="0"/>
-              </a:spcAft>
-              <a:buNone/>
-            </a:pPr>
-            <a:endParaRPr/>
-          </a:p>
-        </p:txBody>
-      </p:sp>
-      <p:sp>
-        <p:nvSpPr>
-          <p:cNvPr id="91" name="Google Shape;91;p17"/>
-          <p:cNvSpPr/>
-          <p:nvPr/>
-        </p:nvSpPr>
-        <p:spPr>
-          <a:xfrm>
-            <a:off x="4274275" y="4250375"/>
-            <a:ext cx="211200" cy="318600"/>
           </a:xfrm>
           <a:prstGeom prst="upArrow">
             <a:avLst>
@@ -10737,7 +10688,7 @@
   <p:cSld>
     <p:spTree>
       <p:nvGrpSpPr>
-        <p:cNvPr id="1" name="Shape 103"/>
+        <p:cNvPr id="1" name="Shape 115"/>
         <p:cNvGrpSpPr/>
         <p:nvPr/>
       </p:nvGrpSpPr>
@@ -10751,7 +10702,7 @@
       </p:grpSpPr>
       <p:sp>
         <p:nvSpPr>
-          <p:cNvPr id="104" name="Google Shape;104;p19"/>
+          <p:cNvPr id="116" name="Google Shape;116;p21"/>
           <p:cNvSpPr txBox="1">
             <a:spLocks noGrp="1"/>
           </p:cNvSpPr>
@@ -10770,45 +10721,30 @@
         </p:spPr>
         <p:txBody>
           <a:bodyPr spcFirstLastPara="1" wrap="square" lIns="91425" tIns="91425" rIns="91425" bIns="91425" anchor="t" anchorCtr="0">
-            <a:normAutofit/>
+            <a:normAutofit fontScale="90000"/>
           </a:bodyPr>
           <a:lstStyle/>
           <a:p>
             <a:pPr marL="0" lvl="0" indent="0" algn="l" rtl="0">
-              <a:lnSpc>
-                <a:spcPct val="150000"/>
-              </a:lnSpc>
-              <a:spcBef>
-                <a:spcPts val="1100"/>
-              </a:spcBef>
-              <a:spcAft>
-                <a:spcPts val="1100"/>
-              </a:spcAft>
-              <a:buClr>
-                <a:schemeClr val="dk1"/>
-              </a:buClr>
-              <a:buSzPts val="1100"/>
-              <a:buFont typeface="Arial"/>
+              <a:spcBef>
+                <a:spcPts val="0"/>
+              </a:spcBef>
+              <a:spcAft>
+                <a:spcPts val="0"/>
+              </a:spcAft>
               <a:buNone/>
             </a:pPr>
             <a:r>
-              <a:rPr lang="en" sz="2500" b="1">
-                <a:solidFill>
-                  <a:srgbClr val="2B2B2B"/>
-                </a:solidFill>
-                <a:highlight>
-                  <a:srgbClr val="FFFFFF"/>
-                </a:highlight>
-              </a:rPr>
-              <a:t>Relay Module Specifications(5 V)</a:t>
+              <a:rPr lang="en" b="1" dirty="0"/>
+              <a:t>Temperature sensor(DS18B20) / LM35:</a:t>
             </a:r>
-            <a:endParaRPr sz="2500" b="1"/>
+            <a:endParaRPr b="1" dirty="0"/>
           </a:p>
         </p:txBody>
       </p:sp>
       <p:sp>
         <p:nvSpPr>
-          <p:cNvPr id="105" name="Google Shape;105;p19"/>
+          <p:cNvPr id="117" name="Google Shape;117;p21"/>
           <p:cNvSpPr txBox="1">
             <a:spLocks noGrp="1"/>
           </p:cNvSpPr>
@@ -10818,8 +10754,8 @@
         </p:nvSpPr>
         <p:spPr>
           <a:xfrm>
-            <a:off x="311700" y="1152475"/>
-            <a:ext cx="8520600" cy="3416400"/>
+            <a:off x="252700" y="1017725"/>
+            <a:ext cx="7056300" cy="3314100"/>
           </a:xfrm>
           <a:prstGeom prst="rect">
             <a:avLst/>
@@ -10827,305 +10763,264 @@
         </p:spPr>
         <p:txBody>
           <a:bodyPr spcFirstLastPara="1" wrap="square" lIns="91425" tIns="91425" rIns="91425" bIns="91425" anchor="t" anchorCtr="0">
-            <a:normAutofit/>
+            <a:noAutofit/>
           </a:bodyPr>
           <a:lstStyle/>
           <a:p>
-            <a:pPr marL="457200" lvl="0" indent="-317500" algn="l" rtl="0">
-              <a:spcBef>
-                <a:spcPts val="1200"/>
-              </a:spcBef>
-              <a:spcAft>
-                <a:spcPts val="0"/>
-              </a:spcAft>
-              <a:buClr>
-                <a:schemeClr val="dk1"/>
-              </a:buClr>
-              <a:buSzPts val="1400"/>
-              <a:buFont typeface="Roboto"/>
-              <a:buChar char="●"/>
+            <a:pPr marL="457200" lvl="0" indent="-306387" algn="l" rtl="0">
+              <a:lnSpc>
+                <a:spcPct val="95000"/>
+              </a:lnSpc>
+              <a:spcBef>
+                <a:spcPts val="0"/>
+              </a:spcBef>
+              <a:spcAft>
+                <a:spcPts val="0"/>
+              </a:spcAft>
+              <a:buSzPts val="1225"/>
+              <a:buAutoNum type="arabicPeriod"/>
             </a:pPr>
             <a:r>
-              <a:rPr lang="en" sz="1400">
-                <a:solidFill>
-                  <a:schemeClr val="dk1"/>
-                </a:solidFill>
-                <a:highlight>
-                  <a:srgbClr val="FFFFFF"/>
-                </a:highlight>
-                <a:latin typeface="Roboto"/>
-                <a:ea typeface="Roboto"/>
-                <a:cs typeface="Roboto"/>
-                <a:sym typeface="Roboto"/>
-              </a:rPr>
-              <a:t>Normal voltage: 5V DC</a:t>
+              <a:rPr lang="en" sz="1225" b="1" dirty="0"/>
+              <a:t>Temperature Range: </a:t>
             </a:r>
-            <a:endParaRPr sz="1400">
-              <a:solidFill>
-                <a:schemeClr val="dk1"/>
-              </a:solidFill>
-              <a:highlight>
-                <a:srgbClr val="FFFFFF"/>
-              </a:highlight>
-              <a:latin typeface="Roboto"/>
-              <a:ea typeface="Roboto"/>
-              <a:cs typeface="Roboto"/>
-              <a:sym typeface="Roboto"/>
-            </a:endParaRPr>
-          </a:p>
-          <a:p>
-            <a:pPr marL="457200" lvl="0" indent="-317500" algn="l" rtl="0">
-              <a:spcBef>
-                <a:spcPts val="0"/>
-              </a:spcBef>
-              <a:spcAft>
-                <a:spcPts val="0"/>
-              </a:spcAft>
-              <a:buClr>
-                <a:schemeClr val="dk1"/>
-              </a:buClr>
-              <a:buSzPts val="1400"/>
-              <a:buFont typeface="Roboto"/>
-              <a:buChar char="●"/>
+            <a:r>
+              <a:rPr lang="en" sz="1225" dirty="0"/>
+              <a:t>  -55°C to +125°C (-67°F to +257°F).  </a:t>
+            </a:r>
+            <a:endParaRPr sz="1225" dirty="0"/>
+          </a:p>
+          <a:p>
+            <a:pPr marL="457200" lvl="0" indent="-306387" algn="l" rtl="0">
+              <a:lnSpc>
+                <a:spcPct val="95000"/>
+              </a:lnSpc>
+              <a:spcBef>
+                <a:spcPts val="0"/>
+              </a:spcBef>
+              <a:spcAft>
+                <a:spcPts val="0"/>
+              </a:spcAft>
+              <a:buSzPts val="1225"/>
+              <a:buAutoNum type="arabicPeriod"/>
             </a:pPr>
             <a:r>
-              <a:rPr lang="en" sz="1400">
-                <a:solidFill>
-                  <a:schemeClr val="dk1"/>
-                </a:solidFill>
-                <a:highlight>
-                  <a:srgbClr val="FFFFFF"/>
-                </a:highlight>
-                <a:latin typeface="Roboto"/>
-                <a:ea typeface="Roboto"/>
-                <a:cs typeface="Roboto"/>
-                <a:sym typeface="Roboto"/>
-              </a:rPr>
-              <a:t>Normal current: 70mA</a:t>
+              <a:rPr lang="en" sz="1225" b="1" dirty="0"/>
+              <a:t>Temperature Resolution:</a:t>
             </a:r>
-            <a:endParaRPr sz="1400">
-              <a:solidFill>
-                <a:schemeClr val="dk1"/>
-              </a:solidFill>
-              <a:highlight>
-                <a:srgbClr val="FFFFFF"/>
-              </a:highlight>
-              <a:latin typeface="Roboto"/>
-              <a:ea typeface="Roboto"/>
-              <a:cs typeface="Roboto"/>
-              <a:sym typeface="Roboto"/>
-            </a:endParaRPr>
-          </a:p>
-          <a:p>
-            <a:pPr marL="457200" lvl="0" indent="-317500" algn="l" rtl="0">
-              <a:spcBef>
-                <a:spcPts val="0"/>
-              </a:spcBef>
-              <a:spcAft>
-                <a:spcPts val="0"/>
-              </a:spcAft>
-              <a:buClr>
-                <a:schemeClr val="dk1"/>
-              </a:buClr>
-              <a:buSzPts val="1400"/>
-              <a:buFont typeface="Roboto"/>
-              <a:buChar char="●"/>
+            <a:r>
+              <a:rPr lang="en" sz="1225" dirty="0"/>
+              <a:t> The sensor can provide temperature readings with a programmable resolution of 9 to 12 bits.  </a:t>
+            </a:r>
+            <a:endParaRPr sz="1225" dirty="0"/>
+          </a:p>
+          <a:p>
+            <a:pPr marL="457200" lvl="0" indent="-306387" algn="l" rtl="0">
+              <a:lnSpc>
+                <a:spcPct val="95000"/>
+              </a:lnSpc>
+              <a:spcBef>
+                <a:spcPts val="0"/>
+              </a:spcBef>
+              <a:spcAft>
+                <a:spcPts val="0"/>
+              </a:spcAft>
+              <a:buSzPts val="1225"/>
+              <a:buAutoNum type="arabicPeriod"/>
             </a:pPr>
             <a:r>
-              <a:rPr lang="en" sz="1400">
-                <a:solidFill>
-                  <a:schemeClr val="dk1"/>
-                </a:solidFill>
-                <a:highlight>
-                  <a:srgbClr val="FFFFFF"/>
-                </a:highlight>
-                <a:latin typeface="Roboto"/>
-                <a:ea typeface="Roboto"/>
-                <a:cs typeface="Roboto"/>
-                <a:sym typeface="Roboto"/>
-              </a:rPr>
-              <a:t>Maximum load current: 10A/250V AC, 10A/30V DC</a:t>
+              <a:rPr lang="en" sz="1225" b="1" dirty="0"/>
+              <a:t>Accuracy: </a:t>
             </a:r>
-            <a:endParaRPr sz="1400">
-              <a:solidFill>
-                <a:schemeClr val="dk1"/>
-              </a:solidFill>
-              <a:highlight>
-                <a:srgbClr val="FFFFFF"/>
-              </a:highlight>
-              <a:latin typeface="Roboto"/>
-              <a:ea typeface="Roboto"/>
-              <a:cs typeface="Roboto"/>
-              <a:sym typeface="Roboto"/>
-            </a:endParaRPr>
-          </a:p>
-          <a:p>
-            <a:pPr marL="457200" lvl="0" indent="-317500" algn="l" rtl="0">
-              <a:spcBef>
-                <a:spcPts val="0"/>
-              </a:spcBef>
-              <a:spcAft>
-                <a:spcPts val="0"/>
-              </a:spcAft>
-              <a:buClr>
-                <a:schemeClr val="dk1"/>
-              </a:buClr>
-              <a:buSzPts val="1400"/>
-              <a:buFont typeface="Roboto"/>
-              <a:buChar char="●"/>
+            <a:r>
+              <a:rPr lang="en" sz="1225" dirty="0"/>
+              <a:t> At 12-bit resolution, it has an accuracy of ±0.0625°C.</a:t>
+            </a:r>
+            <a:endParaRPr sz="1225" dirty="0"/>
+          </a:p>
+          <a:p>
+            <a:pPr marL="457200" lvl="0" indent="-306387" algn="l" rtl="0">
+              <a:lnSpc>
+                <a:spcPct val="95000"/>
+              </a:lnSpc>
+              <a:spcBef>
+                <a:spcPts val="0"/>
+              </a:spcBef>
+              <a:spcAft>
+                <a:spcPts val="0"/>
+              </a:spcAft>
+              <a:buSzPts val="1225"/>
+              <a:buAutoNum type="arabicPeriod"/>
             </a:pPr>
             <a:r>
-              <a:rPr lang="en" sz="1400">
-                <a:solidFill>
-                  <a:schemeClr val="dk1"/>
-                </a:solidFill>
-                <a:highlight>
-                  <a:srgbClr val="FFFFFF"/>
-                </a:highlight>
-                <a:latin typeface="Roboto"/>
-                <a:ea typeface="Roboto"/>
-                <a:cs typeface="Roboto"/>
-                <a:sym typeface="Roboto"/>
-              </a:rPr>
-              <a:t>Maximum switch voltage: 250V AC, 30V DC</a:t>
+              <a:rPr lang="en" sz="1225" b="1" dirty="0"/>
+              <a:t>Operating Voltage:</a:t>
             </a:r>
-            <a:endParaRPr sz="1400">
-              <a:solidFill>
-                <a:schemeClr val="dk1"/>
-              </a:solidFill>
-              <a:highlight>
-                <a:srgbClr val="FFFFFF"/>
-              </a:highlight>
-              <a:latin typeface="Roboto"/>
-              <a:ea typeface="Roboto"/>
-              <a:cs typeface="Roboto"/>
-              <a:sym typeface="Roboto"/>
-            </a:endParaRPr>
-          </a:p>
-          <a:p>
-            <a:pPr marL="457200" lvl="0" indent="-317500" algn="l" rtl="0">
-              <a:spcBef>
-                <a:spcPts val="0"/>
-              </a:spcBef>
-              <a:spcAft>
-                <a:spcPts val="0"/>
-              </a:spcAft>
-              <a:buClr>
-                <a:schemeClr val="dk1"/>
-              </a:buClr>
-              <a:buSzPts val="1400"/>
-              <a:buFont typeface="Roboto"/>
-              <a:buChar char="●"/>
+            <a:r>
+              <a:rPr lang="en" sz="1225" dirty="0"/>
+              <a:t>  3.0V to 5.5V.</a:t>
+            </a:r>
+            <a:endParaRPr sz="1225" dirty="0"/>
+          </a:p>
+          <a:p>
+            <a:pPr marL="457200" lvl="0" indent="-306387" algn="l" rtl="0">
+              <a:lnSpc>
+                <a:spcPct val="95000"/>
+              </a:lnSpc>
+              <a:spcBef>
+                <a:spcPts val="0"/>
+              </a:spcBef>
+              <a:spcAft>
+                <a:spcPts val="0"/>
+              </a:spcAft>
+              <a:buSzPts val="1225"/>
+              <a:buAutoNum type="arabicPeriod"/>
             </a:pPr>
             <a:r>
-              <a:rPr lang="en" sz="1400">
-                <a:solidFill>
-                  <a:schemeClr val="dk1"/>
-                </a:solidFill>
-                <a:highlight>
-                  <a:srgbClr val="FFFFFF"/>
-                </a:highlight>
-                <a:latin typeface="Roboto"/>
-                <a:ea typeface="Roboto"/>
-                <a:cs typeface="Roboto"/>
-                <a:sym typeface="Roboto"/>
-              </a:rPr>
-              <a:t>Operate time: ≤ 10ms</a:t>
+              <a:rPr lang="en" sz="1225" b="1" dirty="0"/>
+              <a:t>Communication Protocol: </a:t>
             </a:r>
-            <a:endParaRPr sz="1400">
-              <a:solidFill>
-                <a:schemeClr val="dk1"/>
-              </a:solidFill>
-              <a:highlight>
-                <a:srgbClr val="FFFFFF"/>
-              </a:highlight>
-              <a:latin typeface="Roboto"/>
-              <a:ea typeface="Roboto"/>
-              <a:cs typeface="Roboto"/>
-              <a:sym typeface="Roboto"/>
-            </a:endParaRPr>
-          </a:p>
-          <a:p>
-            <a:pPr marL="457200" lvl="0" indent="-317500" algn="l" rtl="0">
-              <a:spcBef>
-                <a:spcPts val="0"/>
-              </a:spcBef>
-              <a:spcAft>
-                <a:spcPts val="0"/>
-              </a:spcAft>
-              <a:buClr>
-                <a:schemeClr val="dk1"/>
-              </a:buClr>
-              <a:buSzPts val="1400"/>
-              <a:buFont typeface="Roboto"/>
-              <a:buChar char="●"/>
+            <a:r>
+              <a:rPr lang="en" sz="1225" dirty="0"/>
+              <a:t>The DS18B20 communicates using the 1-Wire communication protocol, which allows multiple DS18B20 sensors to be connected to a single data bus. Each sensor has a unique 64-bit serial code, enabling individual sensor identification on the bus.</a:t>
+            </a:r>
+            <a:endParaRPr sz="1225" dirty="0"/>
+          </a:p>
+          <a:p>
+            <a:pPr marL="457200" lvl="0" indent="-306387" algn="l" rtl="0">
+              <a:lnSpc>
+                <a:spcPct val="95000"/>
+              </a:lnSpc>
+              <a:spcBef>
+                <a:spcPts val="0"/>
+              </a:spcBef>
+              <a:spcAft>
+                <a:spcPts val="0"/>
+              </a:spcAft>
+              <a:buSzPts val="1225"/>
+              <a:buAutoNum type="arabicPeriod"/>
             </a:pPr>
             <a:r>
-              <a:rPr lang="en" sz="1400">
-                <a:solidFill>
-                  <a:schemeClr val="dk1"/>
-                </a:solidFill>
-                <a:highlight>
-                  <a:srgbClr val="FFFFFF"/>
-                </a:highlight>
-                <a:latin typeface="Roboto"/>
-                <a:ea typeface="Roboto"/>
-                <a:cs typeface="Roboto"/>
-                <a:sym typeface="Roboto"/>
-              </a:rPr>
-              <a:t>Release time: ≤ 5ms</a:t>
+              <a:rPr lang="en" sz="1225" b="1" dirty="0"/>
+              <a:t>Conversion Time:</a:t>
             </a:r>
-            <a:endParaRPr sz="1400">
-              <a:solidFill>
-                <a:schemeClr val="dk1"/>
-              </a:solidFill>
-              <a:highlight>
-                <a:srgbClr val="FFFFFF"/>
-              </a:highlight>
-              <a:latin typeface="Roboto"/>
-              <a:ea typeface="Roboto"/>
-              <a:cs typeface="Roboto"/>
-              <a:sym typeface="Roboto"/>
-            </a:endParaRPr>
+            <a:r>
+              <a:rPr lang="en" sz="1225" dirty="0"/>
+              <a:t> At 12-bit resolution, it typically takes around 750 milliseconds.</a:t>
+            </a:r>
+            <a:endParaRPr sz="1225" dirty="0"/>
+          </a:p>
+          <a:p>
+            <a:pPr marL="457200" lvl="0" indent="-306387" algn="l" rtl="0">
+              <a:lnSpc>
+                <a:spcPct val="95000"/>
+              </a:lnSpc>
+              <a:spcBef>
+                <a:spcPts val="0"/>
+              </a:spcBef>
+              <a:spcAft>
+                <a:spcPts val="0"/>
+              </a:spcAft>
+              <a:buSzPts val="1225"/>
+              <a:buAutoNum type="arabicPeriod"/>
+            </a:pPr>
+            <a:r>
+              <a:rPr lang="en" sz="1225" b="1" dirty="0"/>
+              <a:t>Temperature Alarms:</a:t>
+            </a:r>
+            <a:r>
+              <a:rPr lang="en" sz="1225" dirty="0"/>
+              <a:t> It supports programmable high and low temperature alarm triggers, allowing the sensor to alert a microcontroller when the temperature crosses a specified threshold.</a:t>
+            </a:r>
+            <a:endParaRPr sz="1225" dirty="0"/>
+          </a:p>
+          <a:p>
+            <a:pPr marL="457200" lvl="0" indent="-306387" algn="l" rtl="0">
+              <a:lnSpc>
+                <a:spcPct val="95000"/>
+              </a:lnSpc>
+              <a:spcBef>
+                <a:spcPts val="0"/>
+              </a:spcBef>
+              <a:spcAft>
+                <a:spcPts val="0"/>
+              </a:spcAft>
+              <a:buSzPts val="1225"/>
+              <a:buAutoNum type="arabicPeriod"/>
+            </a:pPr>
+            <a:r>
+              <a:rPr lang="en" sz="1225" b="1" dirty="0"/>
+              <a:t>Data Output: </a:t>
+            </a:r>
+            <a:r>
+              <a:rPr lang="en" sz="1225" dirty="0"/>
+              <a:t>Temperature data is output in digital format and can be read via the 1-Wire interface.</a:t>
+            </a:r>
+            <a:endParaRPr sz="1225" dirty="0"/>
+          </a:p>
+          <a:p>
+            <a:pPr marL="457200" lvl="0" indent="-306387" algn="l" rtl="0">
+              <a:lnSpc>
+                <a:spcPct val="95000"/>
+              </a:lnSpc>
+              <a:spcBef>
+                <a:spcPts val="0"/>
+              </a:spcBef>
+              <a:spcAft>
+                <a:spcPts val="0"/>
+              </a:spcAft>
+              <a:buSzPts val="1225"/>
+              <a:buAutoNum type="arabicPeriod"/>
+            </a:pPr>
+            <a:r>
+              <a:rPr lang="en" sz="1225" b="1" dirty="0"/>
+              <a:t>Package Type: </a:t>
+            </a:r>
+            <a:r>
+              <a:rPr lang="en" sz="1225" dirty="0"/>
+              <a:t>The DS18B20 is available in various package types, including TO-92 (for through-hole mounting) and surface-mount packages, making it versatile for different applications.</a:t>
+            </a:r>
+            <a:endParaRPr sz="1225" dirty="0"/>
+          </a:p>
+          <a:p>
+            <a:pPr marL="457200" lvl="0" indent="-306387" algn="l" rtl="0">
+              <a:lnSpc>
+                <a:spcPct val="95000"/>
+              </a:lnSpc>
+              <a:spcBef>
+                <a:spcPts val="0"/>
+              </a:spcBef>
+              <a:spcAft>
+                <a:spcPts val="0"/>
+              </a:spcAft>
+              <a:buSzPts val="1225"/>
+              <a:buAutoNum type="arabicPeriod"/>
+            </a:pPr>
+            <a:r>
+              <a:rPr lang="en" sz="1225" b="1" dirty="0"/>
+              <a:t>Compatibility: </a:t>
+            </a:r>
+            <a:r>
+              <a:rPr lang="en" sz="1225" dirty="0"/>
+              <a:t>The DS18B20 is widely supported by microcontrollers and single-board computers, such as Arduino, Raspberry Pi, and others, thanks to available libraries and code examples.</a:t>
+            </a:r>
+            <a:endParaRPr sz="1225" dirty="0"/>
           </a:p>
           <a:p>
             <a:pPr marL="0" lvl="0" indent="0" algn="l" rtl="0">
               <a:lnSpc>
-                <a:spcPct val="150000"/>
+                <a:spcPct val="95000"/>
               </a:lnSpc>
               <a:spcBef>
                 <a:spcPts val="1200"/>
               </a:spcBef>
               <a:spcAft>
-                <a:spcPts val="0"/>
-              </a:spcAft>
-              <a:buClr>
-                <a:schemeClr val="dk1"/>
-              </a:buClr>
-              <a:buSzPts val="1100"/>
-              <a:buFont typeface="Arial"/>
+                <a:spcPts val="1200"/>
+              </a:spcAft>
+              <a:buSzPts val="688"/>
               <a:buNone/>
             </a:pPr>
-            <a:endParaRPr sz="1650">
-              <a:solidFill>
-                <a:srgbClr val="2B2B2B"/>
-              </a:solidFill>
-              <a:highlight>
-                <a:srgbClr val="FFFFFF"/>
-              </a:highlight>
-            </a:endParaRPr>
-          </a:p>
-          <a:p>
-            <a:pPr marL="0" lvl="0" indent="0" algn="l" rtl="0">
-              <a:spcBef>
-                <a:spcPts val="1100"/>
-              </a:spcBef>
-              <a:spcAft>
-                <a:spcPts val="1200"/>
-              </a:spcAft>
-              <a:buNone/>
-            </a:pPr>
-            <a:endParaRPr/>
+            <a:endParaRPr sz="1125" dirty="0"/>
           </a:p>
         </p:txBody>
       </p:sp>
@@ -11389,7 +11284,7 @@
   <p:cSld>
     <p:spTree>
       <p:nvGrpSpPr>
-        <p:cNvPr id="1" name="Shape 115"/>
+        <p:cNvPr id="1" name="Shape 103"/>
         <p:cNvGrpSpPr/>
         <p:nvPr/>
       </p:nvGrpSpPr>
@@ -11403,7 +11298,7 @@
       </p:grpSpPr>
       <p:sp>
         <p:nvSpPr>
-          <p:cNvPr id="116" name="Google Shape;116;p21"/>
+          <p:cNvPr id="104" name="Google Shape;104;p19"/>
           <p:cNvSpPr txBox="1">
             <a:spLocks noGrp="1"/>
           </p:cNvSpPr>
@@ -11422,30 +11317,45 @@
         </p:spPr>
         <p:txBody>
           <a:bodyPr spcFirstLastPara="1" wrap="square" lIns="91425" tIns="91425" rIns="91425" bIns="91425" anchor="t" anchorCtr="0">
-            <a:normAutofit fontScale="90000"/>
+            <a:normAutofit/>
           </a:bodyPr>
           <a:lstStyle/>
           <a:p>
             <a:pPr marL="0" lvl="0" indent="0" algn="l" rtl="0">
-              <a:spcBef>
-                <a:spcPts val="0"/>
-              </a:spcBef>
-              <a:spcAft>
-                <a:spcPts val="0"/>
-              </a:spcAft>
+              <a:lnSpc>
+                <a:spcPct val="150000"/>
+              </a:lnSpc>
+              <a:spcBef>
+                <a:spcPts val="1100"/>
+              </a:spcBef>
+              <a:spcAft>
+                <a:spcPts val="1100"/>
+              </a:spcAft>
+              <a:buClr>
+                <a:schemeClr val="dk1"/>
+              </a:buClr>
+              <a:buSzPts val="1100"/>
+              <a:buFont typeface="Arial"/>
               <a:buNone/>
             </a:pPr>
             <a:r>
-              <a:rPr lang="en" b="1"/>
-              <a:t>Temperature sensor(DS18B20):</a:t>
+              <a:rPr lang="en" sz="2500" b="1">
+                <a:solidFill>
+                  <a:srgbClr val="2B2B2B"/>
+                </a:solidFill>
+                <a:highlight>
+                  <a:srgbClr val="FFFFFF"/>
+                </a:highlight>
+              </a:rPr>
+              <a:t>Relay Module Specifications(5 V)</a:t>
             </a:r>
-            <a:endParaRPr b="1"/>
+            <a:endParaRPr sz="2500" b="1"/>
           </a:p>
         </p:txBody>
       </p:sp>
       <p:sp>
         <p:nvSpPr>
-          <p:cNvPr id="117" name="Google Shape;117;p21"/>
+          <p:cNvPr id="105" name="Google Shape;105;p19"/>
           <p:cNvSpPr txBox="1">
             <a:spLocks noGrp="1"/>
           </p:cNvSpPr>
@@ -11455,8 +11365,8 @@
         </p:nvSpPr>
         <p:spPr>
           <a:xfrm>
-            <a:off x="252700" y="1017725"/>
-            <a:ext cx="7056300" cy="3314100"/>
+            <a:off x="311700" y="1152475"/>
+            <a:ext cx="8520600" cy="3416400"/>
           </a:xfrm>
           <a:prstGeom prst="rect">
             <a:avLst/>
@@ -11464,264 +11374,305 @@
         </p:spPr>
         <p:txBody>
           <a:bodyPr spcFirstLastPara="1" wrap="square" lIns="91425" tIns="91425" rIns="91425" bIns="91425" anchor="t" anchorCtr="0">
-            <a:noAutofit/>
+            <a:normAutofit/>
           </a:bodyPr>
           <a:lstStyle/>
           <a:p>
-            <a:pPr marL="457200" lvl="0" indent="-306387" algn="l" rtl="0">
-              <a:lnSpc>
-                <a:spcPct val="95000"/>
-              </a:lnSpc>
-              <a:spcBef>
-                <a:spcPts val="0"/>
-              </a:spcBef>
-              <a:spcAft>
-                <a:spcPts val="0"/>
-              </a:spcAft>
-              <a:buSzPts val="1225"/>
-              <a:buAutoNum type="arabicPeriod"/>
+            <a:pPr marL="457200" lvl="0" indent="-317500" algn="l" rtl="0">
+              <a:spcBef>
+                <a:spcPts val="1200"/>
+              </a:spcBef>
+              <a:spcAft>
+                <a:spcPts val="0"/>
+              </a:spcAft>
+              <a:buClr>
+                <a:schemeClr val="dk1"/>
+              </a:buClr>
+              <a:buSzPts val="1400"/>
+              <a:buFont typeface="Roboto"/>
+              <a:buChar char="●"/>
             </a:pPr>
             <a:r>
-              <a:rPr lang="en" sz="1225" b="1"/>
-              <a:t>Temperature Range: </a:t>
+              <a:rPr lang="en" sz="1400">
+                <a:solidFill>
+                  <a:schemeClr val="dk1"/>
+                </a:solidFill>
+                <a:highlight>
+                  <a:srgbClr val="FFFFFF"/>
+                </a:highlight>
+                <a:latin typeface="Roboto"/>
+                <a:ea typeface="Roboto"/>
+                <a:cs typeface="Roboto"/>
+                <a:sym typeface="Roboto"/>
+              </a:rPr>
+              <a:t>Normal voltage: 5V DC</a:t>
             </a:r>
-            <a:r>
-              <a:rPr lang="en" sz="1225"/>
-              <a:t>  -55°C to +125°C (-67°F to +257°F).  </a:t>
-            </a:r>
-            <a:endParaRPr sz="1225"/>
-          </a:p>
-          <a:p>
-            <a:pPr marL="457200" lvl="0" indent="-306387" algn="l" rtl="0">
-              <a:lnSpc>
-                <a:spcPct val="95000"/>
-              </a:lnSpc>
-              <a:spcBef>
-                <a:spcPts val="0"/>
-              </a:spcBef>
-              <a:spcAft>
-                <a:spcPts val="0"/>
-              </a:spcAft>
-              <a:buSzPts val="1225"/>
-              <a:buAutoNum type="arabicPeriod"/>
+            <a:endParaRPr sz="1400">
+              <a:solidFill>
+                <a:schemeClr val="dk1"/>
+              </a:solidFill>
+              <a:highlight>
+                <a:srgbClr val="FFFFFF"/>
+              </a:highlight>
+              <a:latin typeface="Roboto"/>
+              <a:ea typeface="Roboto"/>
+              <a:cs typeface="Roboto"/>
+              <a:sym typeface="Roboto"/>
+            </a:endParaRPr>
+          </a:p>
+          <a:p>
+            <a:pPr marL="457200" lvl="0" indent="-317500" algn="l" rtl="0">
+              <a:spcBef>
+                <a:spcPts val="0"/>
+              </a:spcBef>
+              <a:spcAft>
+                <a:spcPts val="0"/>
+              </a:spcAft>
+              <a:buClr>
+                <a:schemeClr val="dk1"/>
+              </a:buClr>
+              <a:buSzPts val="1400"/>
+              <a:buFont typeface="Roboto"/>
+              <a:buChar char="●"/>
             </a:pPr>
             <a:r>
-              <a:rPr lang="en" sz="1225" b="1"/>
-              <a:t>Temperature Resolution:</a:t>
+              <a:rPr lang="en" sz="1400">
+                <a:solidFill>
+                  <a:schemeClr val="dk1"/>
+                </a:solidFill>
+                <a:highlight>
+                  <a:srgbClr val="FFFFFF"/>
+                </a:highlight>
+                <a:latin typeface="Roboto"/>
+                <a:ea typeface="Roboto"/>
+                <a:cs typeface="Roboto"/>
+                <a:sym typeface="Roboto"/>
+              </a:rPr>
+              <a:t>Normal current: 70mA</a:t>
             </a:r>
-            <a:r>
-              <a:rPr lang="en" sz="1225"/>
-              <a:t> The sensor can provide temperature readings with a programmable resolution of 9 to 12 bits.  </a:t>
-            </a:r>
-            <a:endParaRPr sz="1225"/>
-          </a:p>
-          <a:p>
-            <a:pPr marL="457200" lvl="0" indent="-306387" algn="l" rtl="0">
-              <a:lnSpc>
-                <a:spcPct val="95000"/>
-              </a:lnSpc>
-              <a:spcBef>
-                <a:spcPts val="0"/>
-              </a:spcBef>
-              <a:spcAft>
-                <a:spcPts val="0"/>
-              </a:spcAft>
-              <a:buSzPts val="1225"/>
-              <a:buAutoNum type="arabicPeriod"/>
+            <a:endParaRPr sz="1400">
+              <a:solidFill>
+                <a:schemeClr val="dk1"/>
+              </a:solidFill>
+              <a:highlight>
+                <a:srgbClr val="FFFFFF"/>
+              </a:highlight>
+              <a:latin typeface="Roboto"/>
+              <a:ea typeface="Roboto"/>
+              <a:cs typeface="Roboto"/>
+              <a:sym typeface="Roboto"/>
+            </a:endParaRPr>
+          </a:p>
+          <a:p>
+            <a:pPr marL="457200" lvl="0" indent="-317500" algn="l" rtl="0">
+              <a:spcBef>
+                <a:spcPts val="0"/>
+              </a:spcBef>
+              <a:spcAft>
+                <a:spcPts val="0"/>
+              </a:spcAft>
+              <a:buClr>
+                <a:schemeClr val="dk1"/>
+              </a:buClr>
+              <a:buSzPts val="1400"/>
+              <a:buFont typeface="Roboto"/>
+              <a:buChar char="●"/>
             </a:pPr>
             <a:r>
-              <a:rPr lang="en" sz="1225" b="1"/>
-              <a:t>Accuracy: </a:t>
+              <a:rPr lang="en" sz="1400">
+                <a:solidFill>
+                  <a:schemeClr val="dk1"/>
+                </a:solidFill>
+                <a:highlight>
+                  <a:srgbClr val="FFFFFF"/>
+                </a:highlight>
+                <a:latin typeface="Roboto"/>
+                <a:ea typeface="Roboto"/>
+                <a:cs typeface="Roboto"/>
+                <a:sym typeface="Roboto"/>
+              </a:rPr>
+              <a:t>Maximum load current: 10A/250V AC, 10A/30V DC</a:t>
             </a:r>
-            <a:r>
-              <a:rPr lang="en" sz="1225"/>
-              <a:t> At 12-bit resolution, it has an accuracy of ±0.0625°C.</a:t>
-            </a:r>
-            <a:endParaRPr sz="1225"/>
-          </a:p>
-          <a:p>
-            <a:pPr marL="457200" lvl="0" indent="-306387" algn="l" rtl="0">
-              <a:lnSpc>
-                <a:spcPct val="95000"/>
-              </a:lnSpc>
-              <a:spcBef>
-                <a:spcPts val="0"/>
-              </a:spcBef>
-              <a:spcAft>
-                <a:spcPts val="0"/>
-              </a:spcAft>
-              <a:buSzPts val="1225"/>
-              <a:buAutoNum type="arabicPeriod"/>
+            <a:endParaRPr sz="1400">
+              <a:solidFill>
+                <a:schemeClr val="dk1"/>
+              </a:solidFill>
+              <a:highlight>
+                <a:srgbClr val="FFFFFF"/>
+              </a:highlight>
+              <a:latin typeface="Roboto"/>
+              <a:ea typeface="Roboto"/>
+              <a:cs typeface="Roboto"/>
+              <a:sym typeface="Roboto"/>
+            </a:endParaRPr>
+          </a:p>
+          <a:p>
+            <a:pPr marL="457200" lvl="0" indent="-317500" algn="l" rtl="0">
+              <a:spcBef>
+                <a:spcPts val="0"/>
+              </a:spcBef>
+              <a:spcAft>
+                <a:spcPts val="0"/>
+              </a:spcAft>
+              <a:buClr>
+                <a:schemeClr val="dk1"/>
+              </a:buClr>
+              <a:buSzPts val="1400"/>
+              <a:buFont typeface="Roboto"/>
+              <a:buChar char="●"/>
             </a:pPr>
             <a:r>
-              <a:rPr lang="en" sz="1225" b="1"/>
-              <a:t>Operating Voltage:</a:t>
+              <a:rPr lang="en" sz="1400">
+                <a:solidFill>
+                  <a:schemeClr val="dk1"/>
+                </a:solidFill>
+                <a:highlight>
+                  <a:srgbClr val="FFFFFF"/>
+                </a:highlight>
+                <a:latin typeface="Roboto"/>
+                <a:ea typeface="Roboto"/>
+                <a:cs typeface="Roboto"/>
+                <a:sym typeface="Roboto"/>
+              </a:rPr>
+              <a:t>Maximum switch voltage: 250V AC, 30V DC</a:t>
             </a:r>
-            <a:r>
-              <a:rPr lang="en" sz="1225"/>
-              <a:t>  3.0V to 5.5V.</a:t>
-            </a:r>
-            <a:endParaRPr sz="1225"/>
-          </a:p>
-          <a:p>
-            <a:pPr marL="457200" lvl="0" indent="-306387" algn="l" rtl="0">
-              <a:lnSpc>
-                <a:spcPct val="95000"/>
-              </a:lnSpc>
-              <a:spcBef>
-                <a:spcPts val="0"/>
-              </a:spcBef>
-              <a:spcAft>
-                <a:spcPts val="0"/>
-              </a:spcAft>
-              <a:buSzPts val="1225"/>
-              <a:buAutoNum type="arabicPeriod"/>
+            <a:endParaRPr sz="1400">
+              <a:solidFill>
+                <a:schemeClr val="dk1"/>
+              </a:solidFill>
+              <a:highlight>
+                <a:srgbClr val="FFFFFF"/>
+              </a:highlight>
+              <a:latin typeface="Roboto"/>
+              <a:ea typeface="Roboto"/>
+              <a:cs typeface="Roboto"/>
+              <a:sym typeface="Roboto"/>
+            </a:endParaRPr>
+          </a:p>
+          <a:p>
+            <a:pPr marL="457200" lvl="0" indent="-317500" algn="l" rtl="0">
+              <a:spcBef>
+                <a:spcPts val="0"/>
+              </a:spcBef>
+              <a:spcAft>
+                <a:spcPts val="0"/>
+              </a:spcAft>
+              <a:buClr>
+                <a:schemeClr val="dk1"/>
+              </a:buClr>
+              <a:buSzPts val="1400"/>
+              <a:buFont typeface="Roboto"/>
+              <a:buChar char="●"/>
             </a:pPr>
             <a:r>
-              <a:rPr lang="en" sz="1225" b="1"/>
-              <a:t>Communication Protocol: </a:t>
+              <a:rPr lang="en" sz="1400">
+                <a:solidFill>
+                  <a:schemeClr val="dk1"/>
+                </a:solidFill>
+                <a:highlight>
+                  <a:srgbClr val="FFFFFF"/>
+                </a:highlight>
+                <a:latin typeface="Roboto"/>
+                <a:ea typeface="Roboto"/>
+                <a:cs typeface="Roboto"/>
+                <a:sym typeface="Roboto"/>
+              </a:rPr>
+              <a:t>Operate time: ≤ 10ms</a:t>
             </a:r>
-            <a:r>
-              <a:rPr lang="en" sz="1225"/>
-              <a:t>The DS18B20 communicates using the 1-Wire communication protocol, which allows multiple DS18B20 sensors to be connected to a single data bus. Each sensor has a unique 64-bit serial code, enabling individual sensor identification on the bus.</a:t>
-            </a:r>
-            <a:endParaRPr sz="1225"/>
-          </a:p>
-          <a:p>
-            <a:pPr marL="457200" lvl="0" indent="-306387" algn="l" rtl="0">
-              <a:lnSpc>
-                <a:spcPct val="95000"/>
-              </a:lnSpc>
-              <a:spcBef>
-                <a:spcPts val="0"/>
-              </a:spcBef>
-              <a:spcAft>
-                <a:spcPts val="0"/>
-              </a:spcAft>
-              <a:buSzPts val="1225"/>
-              <a:buAutoNum type="arabicPeriod"/>
+            <a:endParaRPr sz="1400">
+              <a:solidFill>
+                <a:schemeClr val="dk1"/>
+              </a:solidFill>
+              <a:highlight>
+                <a:srgbClr val="FFFFFF"/>
+              </a:highlight>
+              <a:latin typeface="Roboto"/>
+              <a:ea typeface="Roboto"/>
+              <a:cs typeface="Roboto"/>
+              <a:sym typeface="Roboto"/>
+            </a:endParaRPr>
+          </a:p>
+          <a:p>
+            <a:pPr marL="457200" lvl="0" indent="-317500" algn="l" rtl="0">
+              <a:spcBef>
+                <a:spcPts val="0"/>
+              </a:spcBef>
+              <a:spcAft>
+                <a:spcPts val="0"/>
+              </a:spcAft>
+              <a:buClr>
+                <a:schemeClr val="dk1"/>
+              </a:buClr>
+              <a:buSzPts val="1400"/>
+              <a:buFont typeface="Roboto"/>
+              <a:buChar char="●"/>
             </a:pPr>
             <a:r>
-              <a:rPr lang="en" sz="1225" b="1"/>
-              <a:t>Conversion Time:</a:t>
+              <a:rPr lang="en" sz="1400">
+                <a:solidFill>
+                  <a:schemeClr val="dk1"/>
+                </a:solidFill>
+                <a:highlight>
+                  <a:srgbClr val="FFFFFF"/>
+                </a:highlight>
+                <a:latin typeface="Roboto"/>
+                <a:ea typeface="Roboto"/>
+                <a:cs typeface="Roboto"/>
+                <a:sym typeface="Roboto"/>
+              </a:rPr>
+              <a:t>Release time: ≤ 5ms</a:t>
             </a:r>
-            <a:r>
-              <a:rPr lang="en" sz="1225"/>
-              <a:t> At 12-bit resolution, it typically takes around 750 milliseconds.</a:t>
-            </a:r>
-            <a:endParaRPr sz="1225"/>
-          </a:p>
-          <a:p>
-            <a:pPr marL="457200" lvl="0" indent="-306387" algn="l" rtl="0">
-              <a:lnSpc>
-                <a:spcPct val="95000"/>
-              </a:lnSpc>
-              <a:spcBef>
-                <a:spcPts val="0"/>
-              </a:spcBef>
-              <a:spcAft>
-                <a:spcPts val="0"/>
-              </a:spcAft>
-              <a:buSzPts val="1225"/>
-              <a:buAutoNum type="arabicPeriod"/>
-            </a:pPr>
-            <a:r>
-              <a:rPr lang="en" sz="1225" b="1"/>
-              <a:t>Temperature Alarms:</a:t>
-            </a:r>
-            <a:r>
-              <a:rPr lang="en" sz="1225"/>
-              <a:t> It supports programmable high and low temperature alarm triggers, allowing the sensor to alert a microcontroller when the temperature crosses a specified threshold.</a:t>
-            </a:r>
-            <a:endParaRPr sz="1225"/>
-          </a:p>
-          <a:p>
-            <a:pPr marL="457200" lvl="0" indent="-306387" algn="l" rtl="0">
-              <a:lnSpc>
-                <a:spcPct val="95000"/>
-              </a:lnSpc>
-              <a:spcBef>
-                <a:spcPts val="0"/>
-              </a:spcBef>
-              <a:spcAft>
-                <a:spcPts val="0"/>
-              </a:spcAft>
-              <a:buSzPts val="1225"/>
-              <a:buAutoNum type="arabicPeriod"/>
-            </a:pPr>
-            <a:r>
-              <a:rPr lang="en" sz="1225" b="1"/>
-              <a:t>Data Output: </a:t>
-            </a:r>
-            <a:r>
-              <a:rPr lang="en" sz="1225"/>
-              <a:t>Temperature data is output in digital format and can be read via the 1-Wire interface.</a:t>
-            </a:r>
-            <a:endParaRPr sz="1225"/>
-          </a:p>
-          <a:p>
-            <a:pPr marL="457200" lvl="0" indent="-306387" algn="l" rtl="0">
-              <a:lnSpc>
-                <a:spcPct val="95000"/>
-              </a:lnSpc>
-              <a:spcBef>
-                <a:spcPts val="0"/>
-              </a:spcBef>
-              <a:spcAft>
-                <a:spcPts val="0"/>
-              </a:spcAft>
-              <a:buSzPts val="1225"/>
-              <a:buAutoNum type="arabicPeriod"/>
-            </a:pPr>
-            <a:r>
-              <a:rPr lang="en" sz="1225" b="1"/>
-              <a:t>Package Type: </a:t>
-            </a:r>
-            <a:r>
-              <a:rPr lang="en" sz="1225"/>
-              <a:t>The DS18B20 is available in various package types, including TO-92 (for through-hole mounting) and surface-mount packages, making it versatile for different applications.</a:t>
-            </a:r>
-            <a:endParaRPr sz="1225"/>
-          </a:p>
-          <a:p>
-            <a:pPr marL="457200" lvl="0" indent="-306387" algn="l" rtl="0">
-              <a:lnSpc>
-                <a:spcPct val="95000"/>
-              </a:lnSpc>
-              <a:spcBef>
-                <a:spcPts val="0"/>
-              </a:spcBef>
-              <a:spcAft>
-                <a:spcPts val="0"/>
-              </a:spcAft>
-              <a:buSzPts val="1225"/>
-              <a:buAutoNum type="arabicPeriod"/>
-            </a:pPr>
-            <a:r>
-              <a:rPr lang="en" sz="1225" b="1"/>
-              <a:t>Compatibility: </a:t>
-            </a:r>
-            <a:r>
-              <a:rPr lang="en" sz="1225"/>
-              <a:t>The DS18B20 is widely supported by microcontrollers and single-board computers, such as Arduino, Raspberry Pi, and others, thanks to available libraries and code examples.</a:t>
-            </a:r>
-            <a:endParaRPr sz="1225"/>
+            <a:endParaRPr sz="1400">
+              <a:solidFill>
+                <a:schemeClr val="dk1"/>
+              </a:solidFill>
+              <a:highlight>
+                <a:srgbClr val="FFFFFF"/>
+              </a:highlight>
+              <a:latin typeface="Roboto"/>
+              <a:ea typeface="Roboto"/>
+              <a:cs typeface="Roboto"/>
+              <a:sym typeface="Roboto"/>
+            </a:endParaRPr>
           </a:p>
           <a:p>
             <a:pPr marL="0" lvl="0" indent="0" algn="l" rtl="0">
               <a:lnSpc>
-                <a:spcPct val="95000"/>
+                <a:spcPct val="150000"/>
               </a:lnSpc>
               <a:spcBef>
                 <a:spcPts val="1200"/>
               </a:spcBef>
               <a:spcAft>
+                <a:spcPts val="0"/>
+              </a:spcAft>
+              <a:buClr>
+                <a:schemeClr val="dk1"/>
+              </a:buClr>
+              <a:buSzPts val="1100"/>
+              <a:buFont typeface="Arial"/>
+              <a:buNone/>
+            </a:pPr>
+            <a:endParaRPr sz="1650">
+              <a:solidFill>
+                <a:srgbClr val="2B2B2B"/>
+              </a:solidFill>
+              <a:highlight>
+                <a:srgbClr val="FFFFFF"/>
+              </a:highlight>
+            </a:endParaRPr>
+          </a:p>
+          <a:p>
+            <a:pPr marL="0" lvl="0" indent="0" algn="l" rtl="0">
+              <a:spcBef>
+                <a:spcPts val="1100"/>
+              </a:spcBef>
+              <a:spcAft>
                 <a:spcPts val="1200"/>
               </a:spcAft>
-              <a:buSzPts val="688"/>
               <a:buNone/>
             </a:pPr>
-            <a:endParaRPr sz="1125"/>
+            <a:endParaRPr/>
           </a:p>
         </p:txBody>
       </p:sp>

</xml_diff>